<commit_message>
add swagger and update API
</commit_message>
<xml_diff>
--- a/steps.pptx
+++ b/steps.pptx
@@ -192,13 +192,97 @@
 <file path=ppt/revisionInfo.xml><?xml version="1.0" encoding="utf-8"?>
 <p1510:revInfo xmlns:a="http://schemas.openxmlformats.org/drawingml/2006/main" xmlns:r="http://schemas.openxmlformats.org/officeDocument/2006/relationships" xmlns:p1510="http://schemas.microsoft.com/office/powerpoint/2015/10/main">
   <p1510:revLst>
-    <p1510:client id="{858E3F31-6CE0-4B6F-8AB4-97F6337192AE}" v="97" dt="2023-06-14T03:01:36.870"/>
+    <p1510:client id="{58FDC81C-34D9-46C9-83D2-A140BE7BC55A}" v="1" dt="2023-11-15T03:58:04.247"/>
   </p1510:revLst>
 </p1510:revInfo>
 </file>
 
 <file path=ppt/changesInfos/changesInfo1.xml><?xml version="1.0" encoding="utf-8"?>
 <pc:chgInfo xmlns:a="http://schemas.openxmlformats.org/drawingml/2006/main" xmlns:r="http://schemas.openxmlformats.org/officeDocument/2006/relationships" xmlns:ac="http://schemas.microsoft.com/office/drawing/2013/main/command" xmlns:pc="http://schemas.microsoft.com/office/powerpoint/2013/main/command">
+  <pc:docChgLst>
+    <pc:chgData name="NORBEY DANILO MUÑOZ CAÑON" userId="29f64d73-8b12-4c53-a9f3-1c223397a229" providerId="ADAL" clId="{58FDC81C-34D9-46C9-83D2-A140BE7BC55A}"/>
+    <pc:docChg chg="undo custSel modSld">
+      <pc:chgData name="NORBEY DANILO MUÑOZ CAÑON" userId="29f64d73-8b12-4c53-a9f3-1c223397a229" providerId="ADAL" clId="{58FDC81C-34D9-46C9-83D2-A140BE7BC55A}" dt="2023-11-15T03:58:36.435" v="17"/>
+      <pc:docMkLst>
+        <pc:docMk/>
+      </pc:docMkLst>
+      <pc:sldChg chg="modSp mod">
+        <pc:chgData name="NORBEY DANILO MUÑOZ CAÑON" userId="29f64d73-8b12-4c53-a9f3-1c223397a229" providerId="ADAL" clId="{58FDC81C-34D9-46C9-83D2-A140BE7BC55A}" dt="2023-11-15T03:56:23.760" v="1" actId="20577"/>
+        <pc:sldMkLst>
+          <pc:docMk/>
+          <pc:sldMk cId="430815961" sldId="351"/>
+        </pc:sldMkLst>
+        <pc:spChg chg="mod">
+          <ac:chgData name="NORBEY DANILO MUÑOZ CAÑON" userId="29f64d73-8b12-4c53-a9f3-1c223397a229" providerId="ADAL" clId="{58FDC81C-34D9-46C9-83D2-A140BE7BC55A}" dt="2023-11-15T03:56:23.760" v="1" actId="20577"/>
+          <ac:spMkLst>
+            <pc:docMk/>
+            <pc:sldMk cId="430815961" sldId="351"/>
+            <ac:spMk id="5" creationId="{00000000-0000-0000-0000-000000000000}"/>
+          </ac:spMkLst>
+        </pc:spChg>
+      </pc:sldChg>
+      <pc:sldChg chg="modSp mod">
+        <pc:chgData name="NORBEY DANILO MUÑOZ CAÑON" userId="29f64d73-8b12-4c53-a9f3-1c223397a229" providerId="ADAL" clId="{58FDC81C-34D9-46C9-83D2-A140BE7BC55A}" dt="2023-11-15T03:56:36.040" v="3" actId="20577"/>
+        <pc:sldMkLst>
+          <pc:docMk/>
+          <pc:sldMk cId="1618356978" sldId="353"/>
+        </pc:sldMkLst>
+        <pc:spChg chg="mod">
+          <ac:chgData name="NORBEY DANILO MUÑOZ CAÑON" userId="29f64d73-8b12-4c53-a9f3-1c223397a229" providerId="ADAL" clId="{58FDC81C-34D9-46C9-83D2-A140BE7BC55A}" dt="2023-11-15T03:56:36.040" v="3" actId="20577"/>
+          <ac:spMkLst>
+            <pc:docMk/>
+            <pc:sldMk cId="1618356978" sldId="353"/>
+            <ac:spMk id="5" creationId="{00000000-0000-0000-0000-000000000000}"/>
+          </ac:spMkLst>
+        </pc:spChg>
+      </pc:sldChg>
+      <pc:sldChg chg="modSp mod">
+        <pc:chgData name="NORBEY DANILO MUÑOZ CAÑON" userId="29f64d73-8b12-4c53-a9f3-1c223397a229" providerId="ADAL" clId="{58FDC81C-34D9-46C9-83D2-A140BE7BC55A}" dt="2023-11-15T03:57:32.388" v="11"/>
+        <pc:sldMkLst>
+          <pc:docMk/>
+          <pc:sldMk cId="2289934828" sldId="358"/>
+        </pc:sldMkLst>
+        <pc:spChg chg="mod">
+          <ac:chgData name="NORBEY DANILO MUÑOZ CAÑON" userId="29f64d73-8b12-4c53-a9f3-1c223397a229" providerId="ADAL" clId="{58FDC81C-34D9-46C9-83D2-A140BE7BC55A}" dt="2023-11-15T03:57:32.388" v="11"/>
+          <ac:spMkLst>
+            <pc:docMk/>
+            <pc:sldMk cId="2289934828" sldId="358"/>
+            <ac:spMk id="5" creationId="{00000000-0000-0000-0000-000000000000}"/>
+          </ac:spMkLst>
+        </pc:spChg>
+      </pc:sldChg>
+      <pc:sldChg chg="modSp mod">
+        <pc:chgData name="NORBEY DANILO MUÑOZ CAÑON" userId="29f64d73-8b12-4c53-a9f3-1c223397a229" providerId="ADAL" clId="{58FDC81C-34D9-46C9-83D2-A140BE7BC55A}" dt="2023-11-15T03:58:13.482" v="14"/>
+        <pc:sldMkLst>
+          <pc:docMk/>
+          <pc:sldMk cId="1905476530" sldId="360"/>
+        </pc:sldMkLst>
+        <pc:spChg chg="mod">
+          <ac:chgData name="NORBEY DANILO MUÑOZ CAÑON" userId="29f64d73-8b12-4c53-a9f3-1c223397a229" providerId="ADAL" clId="{58FDC81C-34D9-46C9-83D2-A140BE7BC55A}" dt="2023-11-15T03:58:13.482" v="14"/>
+          <ac:spMkLst>
+            <pc:docMk/>
+            <pc:sldMk cId="1905476530" sldId="360"/>
+            <ac:spMk id="5" creationId="{00000000-0000-0000-0000-000000000000}"/>
+          </ac:spMkLst>
+        </pc:spChg>
+      </pc:sldChg>
+      <pc:sldChg chg="modSp mod">
+        <pc:chgData name="NORBEY DANILO MUÑOZ CAÑON" userId="29f64d73-8b12-4c53-a9f3-1c223397a229" providerId="ADAL" clId="{58FDC81C-34D9-46C9-83D2-A140BE7BC55A}" dt="2023-11-15T03:58:36.435" v="17"/>
+        <pc:sldMkLst>
+          <pc:docMk/>
+          <pc:sldMk cId="208731454" sldId="364"/>
+        </pc:sldMkLst>
+        <pc:spChg chg="mod">
+          <ac:chgData name="NORBEY DANILO MUÑOZ CAÑON" userId="29f64d73-8b12-4c53-a9f3-1c223397a229" providerId="ADAL" clId="{58FDC81C-34D9-46C9-83D2-A140BE7BC55A}" dt="2023-11-15T03:58:36.435" v="17"/>
+          <ac:spMkLst>
+            <pc:docMk/>
+            <pc:sldMk cId="208731454" sldId="364"/>
+            <ac:spMk id="5" creationId="{00000000-0000-0000-0000-000000000000}"/>
+          </ac:spMkLst>
+        </pc:spChg>
+      </pc:sldChg>
+    </pc:docChg>
+  </pc:docChgLst>
   <pc:docChgLst>
     <pc:chgData name="NORBEY DANILO MUÑOZ CAÑON" userId="29f64d73-8b12-4c53-a9f3-1c223397a229" providerId="ADAL" clId="{858E3F31-6CE0-4B6F-8AB4-97F6337192AE}"/>
     <pc:docChg chg="undo custSel addSld delSld modSld sldOrd">
@@ -2294,7 +2378,7 @@
           <a:p>
             <a:fld id="{1D8BD707-D9CF-40AE-B4C6-C98DA3205C09}" type="datetimeFigureOut">
               <a:rPr lang="en-US"/>
-              <a:t>6/13/2023</a:t>
+              <a:t>11/14/2023</a:t>
             </a:fld>
             <a:endParaRPr lang="en-US"/>
           </a:p>
@@ -2471,7 +2555,7 @@
           <a:p>
             <a:fld id="{1D8BD707-D9CF-40AE-B4C6-C98DA3205C09}" type="datetimeFigureOut">
               <a:rPr lang="en-US"/>
-              <a:t>6/13/2023</a:t>
+              <a:t>11/14/2023</a:t>
             </a:fld>
             <a:endParaRPr lang="en-US"/>
           </a:p>
@@ -2685,7 +2769,7 @@
           <a:p>
             <a:fld id="{1D8BD707-D9CF-40AE-B4C6-C98DA3205C09}" type="datetimeFigureOut">
               <a:rPr lang="en-US"/>
-              <a:t>6/13/2023</a:t>
+              <a:t>11/14/2023</a:t>
             </a:fld>
             <a:endParaRPr lang="en-US"/>
           </a:p>
@@ -2833,7 +2917,7 @@
           <a:p>
             <a:fld id="{1D8BD707-D9CF-40AE-B4C6-C98DA3205C09}" type="datetimeFigureOut">
               <a:rPr lang="en-US"/>
-              <a:t>6/13/2023</a:t>
+              <a:t>11/14/2023</a:t>
             </a:fld>
             <a:endParaRPr lang="en-US"/>
           </a:p>
@@ -2952,7 +3036,7 @@
           <a:p>
             <a:fld id="{1D8BD707-D9CF-40AE-B4C6-C98DA3205C09}" type="datetimeFigureOut">
               <a:rPr lang="en-US"/>
-              <a:t>6/13/2023</a:t>
+              <a:t>11/14/2023</a:t>
             </a:fld>
             <a:endParaRPr lang="en-US"/>
           </a:p>
@@ -3341,7 +3425,7 @@
           <a:p>
             <a:fld id="{1D8BD707-D9CF-40AE-B4C6-C98DA3205C09}" type="datetimeFigureOut">
               <a:rPr lang="en-US"/>
-              <a:t>6/13/2023</a:t>
+              <a:t>11/14/2023</a:t>
             </a:fld>
             <a:endParaRPr lang="en-US"/>
           </a:p>
@@ -19244,7 +19328,7 @@
                 <a:ea typeface="Roboto Mono" panose="00000009000000000000" pitchFamily="49" charset="0"/>
                 <a:cs typeface="Calibri"/>
               </a:rPr>
-              <a:t>(200).</a:t>
+              <a:t>(201).</a:t>
             </a:r>
             <a:r>
               <a:rPr lang="es-ES" sz="1400" dirty="0" err="1">
@@ -20147,7 +20231,7 @@
                 <a:ea typeface="Roboto Mono" panose="00000009000000000000" pitchFamily="49" charset="0"/>
                 <a:cs typeface="Calibri"/>
               </a:rPr>
-              <a:t>(200).</a:t>
+              <a:t>(201).</a:t>
             </a:r>
             <a:r>
               <a:rPr lang="es-ES" sz="1400" dirty="0" err="1">
@@ -21688,7 +21772,7 @@
         <p:spPr>
           <a:xfrm>
             <a:off x="1512570" y="1750792"/>
-            <a:ext cx="9613900" cy="3548472"/>
+            <a:ext cx="9613900" cy="3894721"/>
           </a:xfrm>
           <a:prstGeom prst="rect">
             <a:avLst/>
@@ -22029,7 +22113,7 @@
                 <a:ea typeface="Roboto Mono" panose="00000009000000000000" pitchFamily="49" charset="0"/>
                 <a:cs typeface="Calibri"/>
               </a:rPr>
-              <a:t>(500).</a:t>
+              <a:t>(404).</a:t>
             </a:r>
             <a:r>
               <a:rPr lang="es-ES" sz="1400" dirty="0" err="1">
@@ -22077,7 +22161,39 @@
                 <a:ea typeface="Roboto Mono" panose="00000009000000000000" pitchFamily="49" charset="0"/>
                 <a:cs typeface="Calibri"/>
               </a:rPr>
-              <a:t>})</a:t>
+              <a:t>, </a:t>
+            </a:r>
+            <a:r>
+              <a:rPr lang="es-ES" sz="1400" dirty="0" err="1">
+                <a:latin typeface="Roboto Mono" panose="00000009000000000000" pitchFamily="49" charset="0"/>
+                <a:ea typeface="Roboto Mono" panose="00000009000000000000" pitchFamily="49" charset="0"/>
+                <a:cs typeface="Calibri"/>
+              </a:rPr>
+              <a:t>info</a:t>
+            </a:r>
+            <a:r>
+              <a:rPr lang="es-ES" sz="1400" dirty="0">
+                <a:latin typeface="Roboto Mono" panose="00000009000000000000" pitchFamily="49" charset="0"/>
+                <a:ea typeface="Roboto Mono" panose="00000009000000000000" pitchFamily="49" charset="0"/>
+                <a:cs typeface="Calibri"/>
+              </a:rPr>
+              <a:t>: `No se encuentra el id ${</a:t>
+            </a:r>
+            <a:r>
+              <a:rPr lang="es-ES" sz="1400" dirty="0" err="1">
+                <a:latin typeface="Roboto Mono" panose="00000009000000000000" pitchFamily="49" charset="0"/>
+                <a:ea typeface="Roboto Mono" panose="00000009000000000000" pitchFamily="49" charset="0"/>
+                <a:cs typeface="Calibri"/>
+              </a:rPr>
+              <a:t>req.params.id</a:t>
+            </a:r>
+            <a:r>
+              <a:rPr lang="es-ES" sz="1400" dirty="0">
+                <a:latin typeface="Roboto Mono" panose="00000009000000000000" pitchFamily="49" charset="0"/>
+                <a:ea typeface="Roboto Mono" panose="00000009000000000000" pitchFamily="49" charset="0"/>
+                <a:cs typeface="Calibri"/>
+              </a:rPr>
+              <a:t>}`})</a:t>
             </a:r>
           </a:p>
           <a:p>
@@ -22523,7 +22639,7 @@
         <p:spPr>
           <a:xfrm>
             <a:off x="1512570" y="1750792"/>
-            <a:ext cx="9613900" cy="4266617"/>
+            <a:ext cx="9613900" cy="4612866"/>
           </a:xfrm>
           <a:prstGeom prst="rect">
             <a:avLst/>
@@ -23023,7 +23139,7 @@
                 <a:ea typeface="Roboto Mono" panose="00000009000000000000" pitchFamily="49" charset="0"/>
                 <a:cs typeface="Calibri"/>
               </a:rPr>
-              <a:t>(400).</a:t>
+              <a:t>(404).</a:t>
             </a:r>
             <a:r>
               <a:rPr lang="es-ES" sz="1400" dirty="0" err="1">
@@ -23055,7 +23171,7 @@
                 <a:ea typeface="Roboto Mono" panose="00000009000000000000" pitchFamily="49" charset="0"/>
                 <a:cs typeface="Calibri"/>
               </a:rPr>
-              <a:t>: </a:t>
+              <a:t>: error.message, </a:t>
             </a:r>
             <a:r>
               <a:rPr lang="es-ES" sz="1400" dirty="0" err="1">
@@ -23063,7 +23179,7 @@
                 <a:ea typeface="Roboto Mono" panose="00000009000000000000" pitchFamily="49" charset="0"/>
                 <a:cs typeface="Calibri"/>
               </a:rPr>
-              <a:t>error.message</a:t>
+              <a:t>info</a:t>
             </a:r>
             <a:r>
               <a:rPr lang="es-ES" sz="1400" dirty="0">
@@ -23071,7 +23187,23 @@
                 <a:ea typeface="Roboto Mono" panose="00000009000000000000" pitchFamily="49" charset="0"/>
                 <a:cs typeface="Calibri"/>
               </a:rPr>
-              <a:t> })</a:t>
+              <a:t>: `No se encuentra el id ${</a:t>
+            </a:r>
+            <a:r>
+              <a:rPr lang="es-ES" sz="1400" dirty="0" err="1">
+                <a:latin typeface="Roboto Mono" panose="00000009000000000000" pitchFamily="49" charset="0"/>
+                <a:ea typeface="Roboto Mono" panose="00000009000000000000" pitchFamily="49" charset="0"/>
+                <a:cs typeface="Calibri"/>
+              </a:rPr>
+              <a:t>req.params.id</a:t>
+            </a:r>
+            <a:r>
+              <a:rPr lang="es-ES" sz="1400" dirty="0">
+                <a:latin typeface="Roboto Mono" panose="00000009000000000000" pitchFamily="49" charset="0"/>
+                <a:ea typeface="Roboto Mono" panose="00000009000000000000" pitchFamily="49" charset="0"/>
+                <a:cs typeface="Calibri"/>
+              </a:rPr>
+              <a:t>}` })</a:t>
             </a:r>
           </a:p>
           <a:p>
@@ -24383,7 +24515,7 @@
         <p:spPr>
           <a:xfrm>
             <a:off x="1512570" y="1750792"/>
-            <a:ext cx="9613900" cy="3907545"/>
+            <a:ext cx="9613900" cy="4253793"/>
           </a:xfrm>
           <a:prstGeom prst="rect">
             <a:avLst/>
@@ -24830,7 +24962,7 @@
                 <a:ea typeface="Roboto Mono" panose="00000009000000000000" pitchFamily="49" charset="0"/>
                 <a:cs typeface="Calibri"/>
               </a:rPr>
-              <a:t>(400).</a:t>
+              <a:t>(404).</a:t>
             </a:r>
             <a:r>
               <a:rPr lang="es-ES" sz="1400" dirty="0" err="1">
@@ -24862,7 +24994,7 @@
                 <a:ea typeface="Roboto Mono" panose="00000009000000000000" pitchFamily="49" charset="0"/>
                 <a:cs typeface="Calibri"/>
               </a:rPr>
-              <a:t>: </a:t>
+              <a:t>: error.message, </a:t>
             </a:r>
             <a:r>
               <a:rPr lang="es-ES" sz="1400" dirty="0" err="1">
@@ -24870,7 +25002,7 @@
                 <a:ea typeface="Roboto Mono" panose="00000009000000000000" pitchFamily="49" charset="0"/>
                 <a:cs typeface="Calibri"/>
               </a:rPr>
-              <a:t>error.message</a:t>
+              <a:t>info</a:t>
             </a:r>
             <a:r>
               <a:rPr lang="es-ES" sz="1400" dirty="0">
@@ -24878,7 +25010,23 @@
                 <a:ea typeface="Roboto Mono" panose="00000009000000000000" pitchFamily="49" charset="0"/>
                 <a:cs typeface="Calibri"/>
               </a:rPr>
-              <a:t> })</a:t>
+              <a:t>: `No se encuentra el id ${</a:t>
+            </a:r>
+            <a:r>
+              <a:rPr lang="es-ES" sz="1400" dirty="0" err="1">
+                <a:latin typeface="Roboto Mono" panose="00000009000000000000" pitchFamily="49" charset="0"/>
+                <a:ea typeface="Roboto Mono" panose="00000009000000000000" pitchFamily="49" charset="0"/>
+                <a:cs typeface="Calibri"/>
+              </a:rPr>
+              <a:t>req.params.id</a:t>
+            </a:r>
+            <a:r>
+              <a:rPr lang="es-ES" sz="1400" dirty="0">
+                <a:latin typeface="Roboto Mono" panose="00000009000000000000" pitchFamily="49" charset="0"/>
+                <a:ea typeface="Roboto Mono" panose="00000009000000000000" pitchFamily="49" charset="0"/>
+                <a:cs typeface="Calibri"/>
+              </a:rPr>
+              <a:t>}` })</a:t>
             </a:r>
           </a:p>
           <a:p>

</xml_diff>